<commit_message>
finalizado documentação tecnica e atualizado slides
</commit_message>
<xml_diff>
--- a/GerenciamentoBovinos/Documentação/Apresentação/SISTEMA DE GERENCIAMENTO DE BOVINOS.pptx
+++ b/GerenciamentoBovinos/Documentação/Apresentação/SISTEMA DE GERENCIAMENTO DE BOVINOS.pptx
@@ -10,7 +10,8 @@
     <p:sldId id="260" r:id="rId4"/>
     <p:sldId id="261" r:id="rId5"/>
     <p:sldId id="258" r:id="rId6"/>
-    <p:sldId id="259" r:id="rId7"/>
+    <p:sldId id="262" r:id="rId7"/>
+    <p:sldId id="259" r:id="rId8"/>
   </p:sldIdLst>
   <p:sldSz cx="12192000" cy="6858000"/>
   <p:notesSz cx="6858000" cy="9144000"/>
@@ -109,6 +110,11 @@
       </a:defRPr>
     </a:lvl9pPr>
   </p:defaultTextStyle>
+  <p:extLst>
+    <p:ext uri="{EFAFB233-063F-42B5-8137-9DF3F51BA10A}">
+      <p15:sldGuideLst xmlns:p15="http://schemas.microsoft.com/office/powerpoint/2012/main"/>
+    </p:ext>
+  </p:extLst>
 </p:presentation>
 </file>
 
@@ -162,7 +168,7 @@
           <a:noFill/>
           <a:extLst>
             <a:ext uri="{909E8E84-426E-40dd-AFC4-6F175D3DCCD1}">
-              <a14:hiddenFill xmlns:a14="http://schemas.microsoft.com/office/drawing/2010/main" xmlns="">
+              <a14:hiddenFill xmlns="" xmlns:a14="http://schemas.microsoft.com/office/drawing/2010/main">
                 <a:solidFill>
                   <a:srgbClr val="FFFFFF"/>
                 </a:solidFill>
@@ -222,7 +228,7 @@
             </a:ln>
             <a:extLst>
               <a:ext uri="{91240B29-F687-4f45-9708-019B960494DF}">
-                <a14:hiddenLine xmlns:a14="http://schemas.microsoft.com/office/drawing/2010/main" xmlns="" w="9525">
+                <a14:hiddenLine xmlns="" xmlns:a14="http://schemas.microsoft.com/office/drawing/2010/main" w="9525">
                   <a:solidFill>
                     <a:srgbClr val="000000"/>
                   </a:solidFill>
@@ -312,7 +318,7 @@
             </a:ln>
             <a:extLst>
               <a:ext uri="{91240B29-F687-4f45-9708-019B960494DF}">
-                <a14:hiddenLine xmlns:a14="http://schemas.microsoft.com/office/drawing/2010/main" xmlns="" w="9525">
+                <a14:hiddenLine xmlns="" xmlns:a14="http://schemas.microsoft.com/office/drawing/2010/main" w="9525">
                   <a:solidFill>
                     <a:srgbClr val="000000"/>
                   </a:solidFill>
@@ -402,7 +408,7 @@
             </a:ln>
             <a:extLst>
               <a:ext uri="{91240B29-F687-4f45-9708-019B960494DF}">
-                <a14:hiddenLine xmlns:a14="http://schemas.microsoft.com/office/drawing/2010/main" xmlns="" w="9525">
+                <a14:hiddenLine xmlns="" xmlns:a14="http://schemas.microsoft.com/office/drawing/2010/main" w="9525">
                   <a:solidFill>
                     <a:srgbClr val="000000"/>
                   </a:solidFill>
@@ -436,7 +442,7 @@
             </a:ln>
             <a:extLst>
               <a:ext uri="{91240B29-F687-4f45-9708-019B960494DF}">
-                <a14:hiddenLine xmlns:a14="http://schemas.microsoft.com/office/drawing/2010/main" xmlns="" w="9525">
+                <a14:hiddenLine xmlns="" xmlns:a14="http://schemas.microsoft.com/office/drawing/2010/main" w="9525">
                   <a:solidFill>
                     <a:srgbClr val="000000"/>
                   </a:solidFill>
@@ -526,7 +532,7 @@
             </a:ln>
             <a:extLst>
               <a:ext uri="{91240B29-F687-4f45-9708-019B960494DF}">
-                <a14:hiddenLine xmlns:a14="http://schemas.microsoft.com/office/drawing/2010/main" xmlns="" w="9525">
+                <a14:hiddenLine xmlns="" xmlns:a14="http://schemas.microsoft.com/office/drawing/2010/main" w="9525">
                   <a:solidFill>
                     <a:srgbClr val="000000"/>
                   </a:solidFill>
@@ -588,7 +594,7 @@
             </a:ln>
             <a:extLst>
               <a:ext uri="{91240B29-F687-4f45-9708-019B960494DF}">
-                <a14:hiddenLine xmlns:a14="http://schemas.microsoft.com/office/drawing/2010/main" xmlns="" w="9525">
+                <a14:hiddenLine xmlns="" xmlns:a14="http://schemas.microsoft.com/office/drawing/2010/main" w="9525">
                   <a:solidFill>
                     <a:srgbClr val="000000"/>
                   </a:solidFill>
@@ -650,7 +656,7 @@
             </a:ln>
             <a:extLst>
               <a:ext uri="{91240B29-F687-4f45-9708-019B960494DF}">
-                <a14:hiddenLine xmlns:a14="http://schemas.microsoft.com/office/drawing/2010/main" xmlns="" w="9525">
+                <a14:hiddenLine xmlns="" xmlns:a14="http://schemas.microsoft.com/office/drawing/2010/main" w="9525">
                   <a:solidFill>
                     <a:srgbClr val="000000"/>
                   </a:solidFill>
@@ -740,7 +746,7 @@
             </a:ln>
             <a:extLst>
               <a:ext uri="{91240B29-F687-4f45-9708-019B960494DF}">
-                <a14:hiddenLine xmlns:a14="http://schemas.microsoft.com/office/drawing/2010/main" xmlns="" w="9525">
+                <a14:hiddenLine xmlns="" xmlns:a14="http://schemas.microsoft.com/office/drawing/2010/main" w="9525">
                   <a:solidFill>
                     <a:srgbClr val="000000"/>
                   </a:solidFill>
@@ -802,7 +808,7 @@
             </a:ln>
             <a:extLst>
               <a:ext uri="{91240B29-F687-4f45-9708-019B960494DF}">
-                <a14:hiddenLine xmlns:a14="http://schemas.microsoft.com/office/drawing/2010/main" xmlns="" w="9525">
+                <a14:hiddenLine xmlns="" xmlns:a14="http://schemas.microsoft.com/office/drawing/2010/main" w="9525">
                   <a:solidFill>
                     <a:srgbClr val="000000"/>
                   </a:solidFill>
@@ -864,7 +870,7 @@
             </a:ln>
             <a:extLst>
               <a:ext uri="{91240B29-F687-4f45-9708-019B960494DF}">
-                <a14:hiddenLine xmlns:a14="http://schemas.microsoft.com/office/drawing/2010/main" xmlns="" w="9525">
+                <a14:hiddenLine xmlns="" xmlns:a14="http://schemas.microsoft.com/office/drawing/2010/main" w="9525">
                   <a:solidFill>
                     <a:srgbClr val="000000"/>
                   </a:solidFill>
@@ -954,7 +960,7 @@
             </a:ln>
             <a:extLst>
               <a:ext uri="{91240B29-F687-4f45-9708-019B960494DF}">
-                <a14:hiddenLine xmlns:a14="http://schemas.microsoft.com/office/drawing/2010/main" xmlns="" w="9525">
+                <a14:hiddenLine xmlns="" xmlns:a14="http://schemas.microsoft.com/office/drawing/2010/main" w="9525">
                   <a:solidFill>
                     <a:srgbClr val="000000"/>
                   </a:solidFill>
@@ -1044,7 +1050,7 @@
             </a:ln>
             <a:extLst>
               <a:ext uri="{91240B29-F687-4f45-9708-019B960494DF}">
-                <a14:hiddenLine xmlns:a14="http://schemas.microsoft.com/office/drawing/2010/main" xmlns="" w="9525">
+                <a14:hiddenLine xmlns="" xmlns:a14="http://schemas.microsoft.com/office/drawing/2010/main" w="9525">
                   <a:solidFill>
                     <a:srgbClr val="000000"/>
                   </a:solidFill>
@@ -1106,7 +1112,7 @@
             </a:ln>
             <a:extLst>
               <a:ext uri="{91240B29-F687-4f45-9708-019B960494DF}">
-                <a14:hiddenLine xmlns:a14="http://schemas.microsoft.com/office/drawing/2010/main" xmlns="" w="9525">
+                <a14:hiddenLine xmlns="" xmlns:a14="http://schemas.microsoft.com/office/drawing/2010/main" w="9525">
                   <a:solidFill>
                     <a:srgbClr val="000000"/>
                   </a:solidFill>
@@ -1216,7 +1222,7 @@
             </a:ln>
             <a:extLst>
               <a:ext uri="{91240B29-F687-4f45-9708-019B960494DF}">
-                <a14:hiddenLine xmlns:a14="http://schemas.microsoft.com/office/drawing/2010/main" xmlns="" w="9525">
+                <a14:hiddenLine xmlns="" xmlns:a14="http://schemas.microsoft.com/office/drawing/2010/main" w="9525">
                   <a:solidFill>
                     <a:srgbClr val="000000"/>
                   </a:solidFill>
@@ -1278,7 +1284,7 @@
             </a:ln>
             <a:extLst>
               <a:ext uri="{91240B29-F687-4f45-9708-019B960494DF}">
-                <a14:hiddenLine xmlns:a14="http://schemas.microsoft.com/office/drawing/2010/main" xmlns="" w="9525">
+                <a14:hiddenLine xmlns="" xmlns:a14="http://schemas.microsoft.com/office/drawing/2010/main" w="9525">
                   <a:solidFill>
                     <a:srgbClr val="000000"/>
                   </a:solidFill>
@@ -1368,7 +1374,7 @@
             </a:ln>
             <a:extLst>
               <a:ext uri="{91240B29-F687-4f45-9708-019B960494DF}">
-                <a14:hiddenLine xmlns:a14="http://schemas.microsoft.com/office/drawing/2010/main" xmlns="" w="9525">
+                <a14:hiddenLine xmlns="" xmlns:a14="http://schemas.microsoft.com/office/drawing/2010/main" w="9525">
                   <a:solidFill>
                     <a:srgbClr val="000000"/>
                   </a:solidFill>
@@ -1458,7 +1464,7 @@
             </a:ln>
             <a:extLst>
               <a:ext uri="{91240B29-F687-4f45-9708-019B960494DF}">
-                <a14:hiddenLine xmlns:a14="http://schemas.microsoft.com/office/drawing/2010/main" xmlns="" w="9525">
+                <a14:hiddenLine xmlns="" xmlns:a14="http://schemas.microsoft.com/office/drawing/2010/main" w="9525">
                   <a:solidFill>
                     <a:srgbClr val="000000"/>
                   </a:solidFill>
@@ -1520,7 +1526,7 @@
             </a:ln>
             <a:extLst>
               <a:ext uri="{91240B29-F687-4f45-9708-019B960494DF}">
-                <a14:hiddenLine xmlns:a14="http://schemas.microsoft.com/office/drawing/2010/main" xmlns="" w="9525">
+                <a14:hiddenLine xmlns="" xmlns:a14="http://schemas.microsoft.com/office/drawing/2010/main" w="9525">
                   <a:solidFill>
                     <a:srgbClr val="000000"/>
                   </a:solidFill>
@@ -1610,7 +1616,7 @@
             </a:ln>
             <a:extLst>
               <a:ext uri="{91240B29-F687-4f45-9708-019B960494DF}">
-                <a14:hiddenLine xmlns:a14="http://schemas.microsoft.com/office/drawing/2010/main" xmlns="" w="9525">
+                <a14:hiddenLine xmlns="" xmlns:a14="http://schemas.microsoft.com/office/drawing/2010/main" w="9525">
                   <a:solidFill>
                     <a:srgbClr val="000000"/>
                   </a:solidFill>
@@ -1700,7 +1706,7 @@
             </a:ln>
             <a:extLst>
               <a:ext uri="{91240B29-F687-4f45-9708-019B960494DF}">
-                <a14:hiddenLine xmlns:a14="http://schemas.microsoft.com/office/drawing/2010/main" xmlns="" w="9525">
+                <a14:hiddenLine xmlns="" xmlns:a14="http://schemas.microsoft.com/office/drawing/2010/main" w="9525">
                   <a:solidFill>
                     <a:srgbClr val="000000"/>
                   </a:solidFill>
@@ -1756,7 +1762,7 @@
             </a:ln>
             <a:extLst>
               <a:ext uri="{91240B29-F687-4f45-9708-019B960494DF}">
-                <a14:hiddenLine xmlns:a14="http://schemas.microsoft.com/office/drawing/2010/main" xmlns="" w="9525">
+                <a14:hiddenLine xmlns="" xmlns:a14="http://schemas.microsoft.com/office/drawing/2010/main" w="9525">
                   <a:solidFill>
                     <a:srgbClr val="000000"/>
                   </a:solidFill>
@@ -1846,7 +1852,7 @@
             </a:ln>
             <a:extLst>
               <a:ext uri="{91240B29-F687-4f45-9708-019B960494DF}">
-                <a14:hiddenLine xmlns:a14="http://schemas.microsoft.com/office/drawing/2010/main" xmlns="" w="9525">
+                <a14:hiddenLine xmlns="" xmlns:a14="http://schemas.microsoft.com/office/drawing/2010/main" w="9525">
                   <a:solidFill>
                     <a:srgbClr val="000000"/>
                   </a:solidFill>
@@ -1902,7 +1908,7 @@
             </a:ln>
             <a:extLst>
               <a:ext uri="{91240B29-F687-4f45-9708-019B960494DF}">
-                <a14:hiddenLine xmlns:a14="http://schemas.microsoft.com/office/drawing/2010/main" xmlns="" w="9525">
+                <a14:hiddenLine xmlns="" xmlns:a14="http://schemas.microsoft.com/office/drawing/2010/main" w="9525">
                   <a:solidFill>
                     <a:srgbClr val="000000"/>
                   </a:solidFill>
@@ -1992,7 +1998,7 @@
             </a:ln>
             <a:extLst>
               <a:ext uri="{91240B29-F687-4f45-9708-019B960494DF}">
-                <a14:hiddenLine xmlns:a14="http://schemas.microsoft.com/office/drawing/2010/main" xmlns="" w="9525">
+                <a14:hiddenLine xmlns="" xmlns:a14="http://schemas.microsoft.com/office/drawing/2010/main" w="9525">
                   <a:solidFill>
                     <a:srgbClr val="000000"/>
                   </a:solidFill>
@@ -2060,7 +2066,7 @@
             </a:ln>
             <a:extLst>
               <a:ext uri="{91240B29-F687-4f45-9708-019B960494DF}">
-                <a14:hiddenLine xmlns:a14="http://schemas.microsoft.com/office/drawing/2010/main" xmlns="" w="9525">
+                <a14:hiddenLine xmlns="" xmlns:a14="http://schemas.microsoft.com/office/drawing/2010/main" w="9525">
                   <a:solidFill>
                     <a:srgbClr val="000000"/>
                   </a:solidFill>
@@ -2150,7 +2156,7 @@
             </a:ln>
             <a:extLst>
               <a:ext uri="{91240B29-F687-4f45-9708-019B960494DF}">
-                <a14:hiddenLine xmlns:a14="http://schemas.microsoft.com/office/drawing/2010/main" xmlns="" w="9525">
+                <a14:hiddenLine xmlns="" xmlns:a14="http://schemas.microsoft.com/office/drawing/2010/main" w="9525">
                   <a:solidFill>
                     <a:srgbClr val="000000"/>
                   </a:solidFill>
@@ -2218,7 +2224,7 @@
             </a:ln>
             <a:extLst>
               <a:ext uri="{91240B29-F687-4f45-9708-019B960494DF}">
-                <a14:hiddenLine xmlns:a14="http://schemas.microsoft.com/office/drawing/2010/main" xmlns="" w="9525">
+                <a14:hiddenLine xmlns="" xmlns:a14="http://schemas.microsoft.com/office/drawing/2010/main" w="9525">
                   <a:solidFill>
                     <a:srgbClr val="000000"/>
                   </a:solidFill>
@@ -2308,7 +2314,7 @@
             </a:ln>
             <a:extLst>
               <a:ext uri="{91240B29-F687-4f45-9708-019B960494DF}">
-                <a14:hiddenLine xmlns:a14="http://schemas.microsoft.com/office/drawing/2010/main" xmlns="" w="9525">
+                <a14:hiddenLine xmlns="" xmlns:a14="http://schemas.microsoft.com/office/drawing/2010/main" w="9525">
                   <a:solidFill>
                     <a:srgbClr val="000000"/>
                   </a:solidFill>
@@ -2342,7 +2348,7 @@
             </a:ln>
             <a:extLst>
               <a:ext uri="{91240B29-F687-4f45-9708-019B960494DF}">
-                <a14:hiddenLine xmlns:a14="http://schemas.microsoft.com/office/drawing/2010/main" xmlns="" w="9525">
+                <a14:hiddenLine xmlns="" xmlns:a14="http://schemas.microsoft.com/office/drawing/2010/main" w="9525">
                   <a:solidFill>
                     <a:srgbClr val="000000"/>
                   </a:solidFill>
@@ -2432,7 +2438,7 @@
             </a:ln>
             <a:extLst>
               <a:ext uri="{91240B29-F687-4f45-9708-019B960494DF}">
-                <a14:hiddenLine xmlns:a14="http://schemas.microsoft.com/office/drawing/2010/main" xmlns="" w="9525">
+                <a14:hiddenLine xmlns="" xmlns:a14="http://schemas.microsoft.com/office/drawing/2010/main" w="9525">
                   <a:solidFill>
                     <a:srgbClr val="000000"/>
                   </a:solidFill>
@@ -2494,7 +2500,7 @@
             </a:ln>
             <a:extLst>
               <a:ext uri="{91240B29-F687-4f45-9708-019B960494DF}">
-                <a14:hiddenLine xmlns:a14="http://schemas.microsoft.com/office/drawing/2010/main" xmlns="" w="9525">
+                <a14:hiddenLine xmlns="" xmlns:a14="http://schemas.microsoft.com/office/drawing/2010/main" w="9525">
                   <a:solidFill>
                     <a:srgbClr val="000000"/>
                   </a:solidFill>
@@ -2556,7 +2562,7 @@
             </a:ln>
             <a:extLst>
               <a:ext uri="{91240B29-F687-4f45-9708-019B960494DF}">
-                <a14:hiddenLine xmlns:a14="http://schemas.microsoft.com/office/drawing/2010/main" xmlns="" w="9525">
+                <a14:hiddenLine xmlns="" xmlns:a14="http://schemas.microsoft.com/office/drawing/2010/main" w="9525">
                   <a:solidFill>
                     <a:srgbClr val="000000"/>
                   </a:solidFill>
@@ -2646,7 +2652,7 @@
             </a:ln>
             <a:extLst>
               <a:ext uri="{91240B29-F687-4f45-9708-019B960494DF}">
-                <a14:hiddenLine xmlns:a14="http://schemas.microsoft.com/office/drawing/2010/main" xmlns="" w="9525">
+                <a14:hiddenLine xmlns="" xmlns:a14="http://schemas.microsoft.com/office/drawing/2010/main" w="9525">
                   <a:solidFill>
                     <a:srgbClr val="000000"/>
                   </a:solidFill>
@@ -2714,7 +2720,7 @@
             </a:ln>
             <a:extLst>
               <a:ext uri="{91240B29-F687-4f45-9708-019B960494DF}">
-                <a14:hiddenLine xmlns:a14="http://schemas.microsoft.com/office/drawing/2010/main" xmlns="" w="9525">
+                <a14:hiddenLine xmlns="" xmlns:a14="http://schemas.microsoft.com/office/drawing/2010/main" w="9525">
                   <a:solidFill>
                     <a:srgbClr val="000000"/>
                   </a:solidFill>
@@ -2776,7 +2782,7 @@
             </a:ln>
             <a:extLst>
               <a:ext uri="{91240B29-F687-4f45-9708-019B960494DF}">
-                <a14:hiddenLine xmlns:a14="http://schemas.microsoft.com/office/drawing/2010/main" xmlns="" w="9525">
+                <a14:hiddenLine xmlns="" xmlns:a14="http://schemas.microsoft.com/office/drawing/2010/main" w="9525">
                   <a:solidFill>
                     <a:srgbClr val="000000"/>
                   </a:solidFill>
@@ -2866,7 +2872,7 @@
             </a:ln>
             <a:extLst>
               <a:ext uri="{91240B29-F687-4f45-9708-019B960494DF}">
-                <a14:hiddenLine xmlns:a14="http://schemas.microsoft.com/office/drawing/2010/main" xmlns="" w="9525">
+                <a14:hiddenLine xmlns="" xmlns:a14="http://schemas.microsoft.com/office/drawing/2010/main" w="9525">
                   <a:solidFill>
                     <a:srgbClr val="000000"/>
                   </a:solidFill>
@@ -2928,7 +2934,7 @@
             </a:ln>
             <a:extLst>
               <a:ext uri="{91240B29-F687-4f45-9708-019B960494DF}">
-                <a14:hiddenLine xmlns:a14="http://schemas.microsoft.com/office/drawing/2010/main" xmlns="" w="9525">
+                <a14:hiddenLine xmlns="" xmlns:a14="http://schemas.microsoft.com/office/drawing/2010/main" w="9525">
                   <a:solidFill>
                     <a:srgbClr val="000000"/>
                   </a:solidFill>
@@ -3018,7 +3024,7 @@
             </a:ln>
             <a:extLst>
               <a:ext uri="{91240B29-F687-4f45-9708-019B960494DF}">
-                <a14:hiddenLine xmlns:a14="http://schemas.microsoft.com/office/drawing/2010/main" xmlns="" w="9525">
+                <a14:hiddenLine xmlns="" xmlns:a14="http://schemas.microsoft.com/office/drawing/2010/main" w="9525">
                   <a:solidFill>
                     <a:srgbClr val="000000"/>
                   </a:solidFill>
@@ -3080,7 +3086,7 @@
             </a:ln>
             <a:extLst>
               <a:ext uri="{91240B29-F687-4f45-9708-019B960494DF}">
-                <a14:hiddenLine xmlns:a14="http://schemas.microsoft.com/office/drawing/2010/main" xmlns="" w="9525">
+                <a14:hiddenLine xmlns="" xmlns:a14="http://schemas.microsoft.com/office/drawing/2010/main" w="9525">
                   <a:solidFill>
                     <a:srgbClr val="000000"/>
                   </a:solidFill>
@@ -3170,7 +3176,7 @@
             </a:ln>
             <a:extLst>
               <a:ext uri="{91240B29-F687-4f45-9708-019B960494DF}">
-                <a14:hiddenLine xmlns:a14="http://schemas.microsoft.com/office/drawing/2010/main" xmlns="" w="9525">
+                <a14:hiddenLine xmlns="" xmlns:a14="http://schemas.microsoft.com/office/drawing/2010/main" w="9525">
                   <a:solidFill>
                     <a:srgbClr val="000000"/>
                   </a:solidFill>
@@ -3204,7 +3210,7 @@
             </a:ln>
             <a:extLst>
               <a:ext uri="{91240B29-F687-4f45-9708-019B960494DF}">
-                <a14:hiddenLine xmlns:a14="http://schemas.microsoft.com/office/drawing/2010/main" xmlns="" w="9525">
+                <a14:hiddenLine xmlns="" xmlns:a14="http://schemas.microsoft.com/office/drawing/2010/main" w="9525">
                   <a:solidFill>
                     <a:srgbClr val="000000"/>
                   </a:solidFill>
@@ -3269,7 +3275,7 @@
             </a:ln>
             <a:extLst>
               <a:ext uri="{91240B29-F687-4f45-9708-019B960494DF}">
-                <a14:hiddenLine xmlns:a14="http://schemas.microsoft.com/office/drawing/2010/main" xmlns="" w="9525">
+                <a14:hiddenLine xmlns="" xmlns:a14="http://schemas.microsoft.com/office/drawing/2010/main" w="9525">
                   <a:solidFill>
                     <a:srgbClr val="000000"/>
                   </a:solidFill>
@@ -3359,7 +3365,7 @@
             </a:ln>
             <a:extLst>
               <a:ext uri="{91240B29-F687-4f45-9708-019B960494DF}">
-                <a14:hiddenLine xmlns:a14="http://schemas.microsoft.com/office/drawing/2010/main" xmlns="" w="9525">
+                <a14:hiddenLine xmlns="" xmlns:a14="http://schemas.microsoft.com/office/drawing/2010/main" w="9525">
                   <a:solidFill>
                     <a:srgbClr val="000000"/>
                   </a:solidFill>
@@ -3421,7 +3427,7 @@
             </a:ln>
             <a:extLst>
               <a:ext uri="{91240B29-F687-4f45-9708-019B960494DF}">
-                <a14:hiddenLine xmlns:a14="http://schemas.microsoft.com/office/drawing/2010/main" xmlns="" w="9525">
+                <a14:hiddenLine xmlns="" xmlns:a14="http://schemas.microsoft.com/office/drawing/2010/main" w="9525">
                   <a:solidFill>
                     <a:srgbClr val="000000"/>
                   </a:solidFill>
@@ -3511,7 +3517,7 @@
             </a:ln>
             <a:extLst>
               <a:ext uri="{91240B29-F687-4f45-9708-019B960494DF}">
-                <a14:hiddenLine xmlns:a14="http://schemas.microsoft.com/office/drawing/2010/main" xmlns="" w="9525">
+                <a14:hiddenLine xmlns="" xmlns:a14="http://schemas.microsoft.com/office/drawing/2010/main" w="9525">
                   <a:solidFill>
                     <a:srgbClr val="000000"/>
                   </a:solidFill>
@@ -3601,7 +3607,7 @@
             </a:ln>
             <a:extLst>
               <a:ext uri="{91240B29-F687-4f45-9708-019B960494DF}">
-                <a14:hiddenLine xmlns:a14="http://schemas.microsoft.com/office/drawing/2010/main" xmlns="" w="9525">
+                <a14:hiddenLine xmlns="" xmlns:a14="http://schemas.microsoft.com/office/drawing/2010/main" w="9525">
                   <a:solidFill>
                     <a:srgbClr val="000000"/>
                   </a:solidFill>
@@ -3666,7 +3672,7 @@
             </a:ln>
             <a:extLst>
               <a:ext uri="{91240B29-F687-4f45-9708-019B960494DF}">
-                <a14:hiddenLine xmlns:a14="http://schemas.microsoft.com/office/drawing/2010/main" xmlns="" w="9525">
+                <a14:hiddenLine xmlns="" xmlns:a14="http://schemas.microsoft.com/office/drawing/2010/main" w="9525">
                   <a:solidFill>
                     <a:srgbClr val="000000"/>
                   </a:solidFill>
@@ -3728,7 +3734,7 @@
             </a:ln>
             <a:extLst>
               <a:ext uri="{91240B29-F687-4f45-9708-019B960494DF}">
-                <a14:hiddenLine xmlns:a14="http://schemas.microsoft.com/office/drawing/2010/main" xmlns="" w="9525">
+                <a14:hiddenLine xmlns="" xmlns:a14="http://schemas.microsoft.com/office/drawing/2010/main" w="9525">
                   <a:solidFill>
                     <a:srgbClr val="000000"/>
                   </a:solidFill>
@@ -3818,7 +3824,7 @@
             </a:ln>
             <a:extLst>
               <a:ext uri="{91240B29-F687-4f45-9708-019B960494DF}">
-                <a14:hiddenLine xmlns:a14="http://schemas.microsoft.com/office/drawing/2010/main" xmlns="" w="9525">
+                <a14:hiddenLine xmlns="" xmlns:a14="http://schemas.microsoft.com/office/drawing/2010/main" w="9525">
                   <a:solidFill>
                     <a:srgbClr val="000000"/>
                   </a:solidFill>
@@ -3908,7 +3914,7 @@
             </a:ln>
             <a:extLst>
               <a:ext uri="{91240B29-F687-4f45-9708-019B960494DF}">
-                <a14:hiddenLine xmlns:a14="http://schemas.microsoft.com/office/drawing/2010/main" xmlns="" w="9525">
+                <a14:hiddenLine xmlns="" xmlns:a14="http://schemas.microsoft.com/office/drawing/2010/main" w="9525">
                   <a:solidFill>
                     <a:srgbClr val="000000"/>
                   </a:solidFill>
@@ -3970,7 +3976,7 @@
             </a:ln>
             <a:extLst>
               <a:ext uri="{91240B29-F687-4f45-9708-019B960494DF}">
-                <a14:hiddenLine xmlns:a14="http://schemas.microsoft.com/office/drawing/2010/main" xmlns="" w="9525">
+                <a14:hiddenLine xmlns="" xmlns:a14="http://schemas.microsoft.com/office/drawing/2010/main" w="9525">
                   <a:solidFill>
                     <a:srgbClr val="000000"/>
                   </a:solidFill>
@@ -4090,7 +4096,7 @@
             </a:ln>
             <a:extLst>
               <a:ext uri="{91240B29-F687-4f45-9708-019B960494DF}">
-                <a14:hiddenLine xmlns:a14="http://schemas.microsoft.com/office/drawing/2010/main" xmlns="" w="9525">
+                <a14:hiddenLine xmlns="" xmlns:a14="http://schemas.microsoft.com/office/drawing/2010/main" w="9525">
                   <a:solidFill>
                     <a:srgbClr val="000000"/>
                   </a:solidFill>
@@ -4158,7 +4164,7 @@
             </a:ln>
             <a:extLst>
               <a:ext uri="{91240B29-F687-4f45-9708-019B960494DF}">
-                <a14:hiddenLine xmlns:a14="http://schemas.microsoft.com/office/drawing/2010/main" xmlns="" w="9525">
+                <a14:hiddenLine xmlns="" xmlns:a14="http://schemas.microsoft.com/office/drawing/2010/main" w="9525">
                   <a:solidFill>
                     <a:srgbClr val="000000"/>
                   </a:solidFill>
@@ -4248,7 +4254,7 @@
             </a:ln>
             <a:extLst>
               <a:ext uri="{91240B29-F687-4f45-9708-019B960494DF}">
-                <a14:hiddenLine xmlns:a14="http://schemas.microsoft.com/office/drawing/2010/main" xmlns="" w="9525">
+                <a14:hiddenLine xmlns="" xmlns:a14="http://schemas.microsoft.com/office/drawing/2010/main" w="9525">
                   <a:solidFill>
                     <a:srgbClr val="000000"/>
                   </a:solidFill>
@@ -4388,7 +4394,7 @@
           <a:p>
             <a:fld id="{48A87A34-81AB-432B-8DAE-1953F412C126}" type="datetimeFigureOut">
               <a:rPr lang="en-US" dirty="0"/>
-              <a:t>11/26/2019</a:t>
+              <a:t>11/27/2019</a:t>
             </a:fld>
             <a:endParaRPr lang="en-US" dirty="0"/>
           </a:p>
@@ -4650,7 +4656,7 @@
           <a:p>
             <a:fld id="{48A87A34-81AB-432B-8DAE-1953F412C126}" type="datetimeFigureOut">
               <a:rPr lang="en-US" dirty="0"/>
-              <a:t>11/26/2019</a:t>
+              <a:t>11/27/2019</a:t>
             </a:fld>
             <a:endParaRPr lang="en-US" dirty="0"/>
           </a:p>
@@ -4841,7 +4847,7 @@
           <a:p>
             <a:fld id="{48A87A34-81AB-432B-8DAE-1953F412C126}" type="datetimeFigureOut">
               <a:rPr lang="en-US" dirty="0"/>
-              <a:t>11/26/2019</a:t>
+              <a:t>11/27/2019</a:t>
             </a:fld>
             <a:endParaRPr lang="en-US" dirty="0"/>
           </a:p>
@@ -5099,7 +5105,7 @@
           <a:p>
             <a:fld id="{48A87A34-81AB-432B-8DAE-1953F412C126}" type="datetimeFigureOut">
               <a:rPr lang="en-US" dirty="0"/>
-              <a:t>11/26/2019</a:t>
+              <a:t>11/27/2019</a:t>
             </a:fld>
             <a:endParaRPr lang="en-US" dirty="0"/>
           </a:p>
@@ -5528,7 +5534,7 @@
           <a:p>
             <a:fld id="{48A87A34-81AB-432B-8DAE-1953F412C126}" type="datetimeFigureOut">
               <a:rPr lang="en-US" dirty="0"/>
-              <a:t>11/26/2019</a:t>
+              <a:t>11/27/2019</a:t>
             </a:fld>
             <a:endParaRPr lang="en-US" dirty="0"/>
           </a:p>
@@ -6069,7 +6075,7 @@
           <a:p>
             <a:fld id="{48A87A34-81AB-432B-8DAE-1953F412C126}" type="datetimeFigureOut">
               <a:rPr lang="en-US" dirty="0"/>
-              <a:t>11/26/2019</a:t>
+              <a:t>11/27/2019</a:t>
             </a:fld>
             <a:endParaRPr lang="en-US" dirty="0"/>
           </a:p>
@@ -6784,7 +6790,7 @@
           <a:p>
             <a:fld id="{48A87A34-81AB-432B-8DAE-1953F412C126}" type="datetimeFigureOut">
               <a:rPr lang="en-US" dirty="0"/>
-              <a:t>11/26/2019</a:t>
+              <a:t>11/27/2019</a:t>
             </a:fld>
             <a:endParaRPr lang="en-US" dirty="0"/>
           </a:p>
@@ -6949,7 +6955,7 @@
           <a:p>
             <a:fld id="{48A87A34-81AB-432B-8DAE-1953F412C126}" type="datetimeFigureOut">
               <a:rPr lang="en-US" dirty="0"/>
-              <a:t>11/26/2019</a:t>
+              <a:t>11/27/2019</a:t>
             </a:fld>
             <a:endParaRPr lang="en-US" dirty="0"/>
           </a:p>
@@ -7124,7 +7130,7 @@
           <a:p>
             <a:fld id="{48A87A34-81AB-432B-8DAE-1953F412C126}" type="datetimeFigureOut">
               <a:rPr lang="en-US" dirty="0"/>
-              <a:t>11/26/2019</a:t>
+              <a:t>11/27/2019</a:t>
             </a:fld>
             <a:endParaRPr lang="en-US" dirty="0"/>
           </a:p>
@@ -7289,7 +7295,7 @@
           <a:p>
             <a:fld id="{48A87A34-81AB-432B-8DAE-1953F412C126}" type="datetimeFigureOut">
               <a:rPr lang="en-US" dirty="0"/>
-              <a:t>11/26/2019</a:t>
+              <a:t>11/27/2019</a:t>
             </a:fld>
             <a:endParaRPr lang="en-US" dirty="0"/>
           </a:p>
@@ -7534,7 +7540,7 @@
           <a:p>
             <a:fld id="{48A87A34-81AB-432B-8DAE-1953F412C126}" type="datetimeFigureOut">
               <a:rPr lang="en-US" dirty="0"/>
-              <a:t>11/26/2019</a:t>
+              <a:t>11/27/2019</a:t>
             </a:fld>
             <a:endParaRPr lang="en-US" dirty="0"/>
           </a:p>
@@ -7761,7 +7767,7 @@
           <a:p>
             <a:fld id="{48A87A34-81AB-432B-8DAE-1953F412C126}" type="datetimeFigureOut">
               <a:rPr lang="en-US" dirty="0"/>
-              <a:t>11/26/2019</a:t>
+              <a:t>11/27/2019</a:t>
             </a:fld>
             <a:endParaRPr lang="en-US" dirty="0"/>
           </a:p>
@@ -8137,7 +8143,7 @@
           <a:p>
             <a:fld id="{48A87A34-81AB-432B-8DAE-1953F412C126}" type="datetimeFigureOut">
               <a:rPr lang="en-US" dirty="0"/>
-              <a:t>11/26/2019</a:t>
+              <a:t>11/27/2019</a:t>
             </a:fld>
             <a:endParaRPr lang="en-US" dirty="0"/>
           </a:p>
@@ -8250,7 +8256,7 @@
           <a:p>
             <a:fld id="{48A87A34-81AB-432B-8DAE-1953F412C126}" type="datetimeFigureOut">
               <a:rPr lang="en-US" dirty="0"/>
-              <a:t>11/26/2019</a:t>
+              <a:t>11/27/2019</a:t>
             </a:fld>
             <a:endParaRPr lang="en-US" dirty="0"/>
           </a:p>
@@ -8340,7 +8346,7 @@
           <a:p>
             <a:fld id="{48A87A34-81AB-432B-8DAE-1953F412C126}" type="datetimeFigureOut">
               <a:rPr lang="en-US" dirty="0"/>
-              <a:t>11/26/2019</a:t>
+              <a:t>11/27/2019</a:t>
             </a:fld>
             <a:endParaRPr lang="en-US" dirty="0"/>
           </a:p>
@@ -8584,7 +8590,7 @@
           <a:p>
             <a:fld id="{48A87A34-81AB-432B-8DAE-1953F412C126}" type="datetimeFigureOut">
               <a:rPr lang="en-US" dirty="0"/>
-              <a:t>11/26/2019</a:t>
+              <a:t>11/27/2019</a:t>
             </a:fld>
             <a:endParaRPr lang="en-US" dirty="0"/>
           </a:p>
@@ -8859,7 +8865,7 @@
           <a:p>
             <a:fld id="{48A87A34-81AB-432B-8DAE-1953F412C126}" type="datetimeFigureOut">
               <a:rPr lang="en-US" dirty="0"/>
-              <a:t>11/26/2019</a:t>
+              <a:t>11/27/2019</a:t>
             </a:fld>
             <a:endParaRPr lang="en-US" dirty="0"/>
           </a:p>
@@ -8970,7 +8976,7 @@
           <a:noFill/>
           <a:extLst>
             <a:ext uri="{909E8E84-426E-40dd-AFC4-6F175D3DCCD1}">
-              <a14:hiddenFill xmlns:a14="http://schemas.microsoft.com/office/drawing/2010/main" xmlns="">
+              <a14:hiddenFill xmlns="" xmlns:a14="http://schemas.microsoft.com/office/drawing/2010/main">
                 <a:solidFill>
                   <a:srgbClr val="FFFFFF"/>
                 </a:solidFill>
@@ -9044,7 +9050,7 @@
               </a:ln>
               <a:extLst>
                 <a:ext uri="{91240B29-F687-4f45-9708-019B960494DF}">
-                  <a14:hiddenLine xmlns:a14="http://schemas.microsoft.com/office/drawing/2010/main" xmlns="" w="9525">
+                  <a14:hiddenLine xmlns="" xmlns:a14="http://schemas.microsoft.com/office/drawing/2010/main" w="9525">
                     <a:solidFill>
                       <a:srgbClr val="000000"/>
                     </a:solidFill>
@@ -9134,7 +9140,7 @@
               </a:ln>
               <a:extLst>
                 <a:ext uri="{91240B29-F687-4f45-9708-019B960494DF}">
-                  <a14:hiddenLine xmlns:a14="http://schemas.microsoft.com/office/drawing/2010/main" xmlns="" w="9525">
+                  <a14:hiddenLine xmlns="" xmlns:a14="http://schemas.microsoft.com/office/drawing/2010/main" w="9525">
                     <a:solidFill>
                       <a:srgbClr val="000000"/>
                     </a:solidFill>
@@ -9224,7 +9230,7 @@
               </a:ln>
               <a:extLst>
                 <a:ext uri="{91240B29-F687-4f45-9708-019B960494DF}">
-                  <a14:hiddenLine xmlns:a14="http://schemas.microsoft.com/office/drawing/2010/main" xmlns="" w="9525">
+                  <a14:hiddenLine xmlns="" xmlns:a14="http://schemas.microsoft.com/office/drawing/2010/main" w="9525">
                     <a:solidFill>
                       <a:srgbClr val="000000"/>
                     </a:solidFill>
@@ -9286,7 +9292,7 @@
               </a:ln>
               <a:extLst>
                 <a:ext uri="{91240B29-F687-4f45-9708-019B960494DF}">
-                  <a14:hiddenLine xmlns:a14="http://schemas.microsoft.com/office/drawing/2010/main" xmlns="" w="9525">
+                  <a14:hiddenLine xmlns="" xmlns:a14="http://schemas.microsoft.com/office/drawing/2010/main" w="9525">
                     <a:solidFill>
                       <a:srgbClr val="000000"/>
                     </a:solidFill>
@@ -9376,7 +9382,7 @@
               </a:ln>
               <a:extLst>
                 <a:ext uri="{91240B29-F687-4f45-9708-019B960494DF}">
-                  <a14:hiddenLine xmlns:a14="http://schemas.microsoft.com/office/drawing/2010/main" xmlns="" w="9525">
+                  <a14:hiddenLine xmlns="" xmlns:a14="http://schemas.microsoft.com/office/drawing/2010/main" w="9525">
                     <a:solidFill>
                       <a:srgbClr val="000000"/>
                     </a:solidFill>
@@ -9438,7 +9444,7 @@
               </a:ln>
               <a:extLst>
                 <a:ext uri="{91240B29-F687-4f45-9708-019B960494DF}">
-                  <a14:hiddenLine xmlns:a14="http://schemas.microsoft.com/office/drawing/2010/main" xmlns="" w="9525">
+                  <a14:hiddenLine xmlns="" xmlns:a14="http://schemas.microsoft.com/office/drawing/2010/main" w="9525">
                     <a:solidFill>
                       <a:srgbClr val="000000"/>
                     </a:solidFill>
@@ -9500,7 +9506,7 @@
               </a:ln>
               <a:extLst>
                 <a:ext uri="{91240B29-F687-4f45-9708-019B960494DF}">
-                  <a14:hiddenLine xmlns:a14="http://schemas.microsoft.com/office/drawing/2010/main" xmlns="" w="9525">
+                  <a14:hiddenLine xmlns="" xmlns:a14="http://schemas.microsoft.com/office/drawing/2010/main" w="9525">
                     <a:solidFill>
                       <a:srgbClr val="000000"/>
                     </a:solidFill>
@@ -9590,7 +9596,7 @@
               </a:ln>
               <a:extLst>
                 <a:ext uri="{91240B29-F687-4f45-9708-019B960494DF}">
-                  <a14:hiddenLine xmlns:a14="http://schemas.microsoft.com/office/drawing/2010/main" xmlns="" w="9525">
+                  <a14:hiddenLine xmlns="" xmlns:a14="http://schemas.microsoft.com/office/drawing/2010/main" w="9525">
                     <a:solidFill>
                       <a:srgbClr val="000000"/>
                     </a:solidFill>
@@ -9680,7 +9686,7 @@
               </a:ln>
               <a:extLst>
                 <a:ext uri="{91240B29-F687-4f45-9708-019B960494DF}">
-                  <a14:hiddenLine xmlns:a14="http://schemas.microsoft.com/office/drawing/2010/main" xmlns="" w="9525">
+                  <a14:hiddenLine xmlns="" xmlns:a14="http://schemas.microsoft.com/office/drawing/2010/main" w="9525">
                     <a:solidFill>
                       <a:srgbClr val="000000"/>
                     </a:solidFill>
@@ -9742,7 +9748,7 @@
               </a:ln>
               <a:extLst>
                 <a:ext uri="{91240B29-F687-4f45-9708-019B960494DF}">
-                  <a14:hiddenLine xmlns:a14="http://schemas.microsoft.com/office/drawing/2010/main" xmlns="" w="9525">
+                  <a14:hiddenLine xmlns="" xmlns:a14="http://schemas.microsoft.com/office/drawing/2010/main" w="9525">
                     <a:solidFill>
                       <a:srgbClr val="000000"/>
                     </a:solidFill>
@@ -9852,7 +9858,7 @@
               </a:ln>
               <a:extLst>
                 <a:ext uri="{91240B29-F687-4f45-9708-019B960494DF}">
-                  <a14:hiddenLine xmlns:a14="http://schemas.microsoft.com/office/drawing/2010/main" xmlns="" w="9525">
+                  <a14:hiddenLine xmlns="" xmlns:a14="http://schemas.microsoft.com/office/drawing/2010/main" w="9525">
                     <a:solidFill>
                       <a:srgbClr val="000000"/>
                     </a:solidFill>
@@ -9936,7 +9942,7 @@
               </a:ln>
               <a:extLst>
                 <a:ext uri="{91240B29-F687-4f45-9708-019B960494DF}">
-                  <a14:hiddenLine xmlns:a14="http://schemas.microsoft.com/office/drawing/2010/main" xmlns="" w="9525">
+                  <a14:hiddenLine xmlns="" xmlns:a14="http://schemas.microsoft.com/office/drawing/2010/main" w="9525">
                     <a:solidFill>
                       <a:srgbClr val="000000"/>
                     </a:solidFill>
@@ -9998,7 +10004,7 @@
               </a:ln>
               <a:extLst>
                 <a:ext uri="{91240B29-F687-4f45-9708-019B960494DF}">
-                  <a14:hiddenLine xmlns:a14="http://schemas.microsoft.com/office/drawing/2010/main" xmlns="" w="9525">
+                  <a14:hiddenLine xmlns="" xmlns:a14="http://schemas.microsoft.com/office/drawing/2010/main" w="9525">
                     <a:solidFill>
                       <a:srgbClr val="000000"/>
                     </a:solidFill>
@@ -10060,7 +10066,7 @@
               </a:ln>
               <a:extLst>
                 <a:ext uri="{91240B29-F687-4f45-9708-019B960494DF}">
-                  <a14:hiddenLine xmlns:a14="http://schemas.microsoft.com/office/drawing/2010/main" xmlns="" w="9525">
+                  <a14:hiddenLine xmlns="" xmlns:a14="http://schemas.microsoft.com/office/drawing/2010/main" w="9525">
                     <a:solidFill>
                       <a:srgbClr val="000000"/>
                     </a:solidFill>
@@ -10150,7 +10156,7 @@
               </a:ln>
               <a:extLst>
                 <a:ext uri="{91240B29-F687-4f45-9708-019B960494DF}">
-                  <a14:hiddenLine xmlns:a14="http://schemas.microsoft.com/office/drawing/2010/main" xmlns="" w="9525">
+                  <a14:hiddenLine xmlns="" xmlns:a14="http://schemas.microsoft.com/office/drawing/2010/main" w="9525">
                     <a:solidFill>
                       <a:srgbClr val="000000"/>
                     </a:solidFill>
@@ -10184,7 +10190,7 @@
               </a:ln>
               <a:extLst>
                 <a:ext uri="{91240B29-F687-4f45-9708-019B960494DF}">
-                  <a14:hiddenLine xmlns:a14="http://schemas.microsoft.com/office/drawing/2010/main" xmlns="" w="9525">
+                  <a14:hiddenLine xmlns="" xmlns:a14="http://schemas.microsoft.com/office/drawing/2010/main" w="9525">
                     <a:solidFill>
                       <a:srgbClr val="000000"/>
                     </a:solidFill>
@@ -10249,7 +10255,7 @@
               </a:ln>
               <a:extLst>
                 <a:ext uri="{91240B29-F687-4f45-9708-019B960494DF}">
-                  <a14:hiddenLine xmlns:a14="http://schemas.microsoft.com/office/drawing/2010/main" xmlns="" w="9525">
+                  <a14:hiddenLine xmlns="" xmlns:a14="http://schemas.microsoft.com/office/drawing/2010/main" w="9525">
                     <a:solidFill>
                       <a:srgbClr val="000000"/>
                     </a:solidFill>
@@ -10339,7 +10345,7 @@
               </a:ln>
               <a:extLst>
                 <a:ext uri="{91240B29-F687-4f45-9708-019B960494DF}">
-                  <a14:hiddenLine xmlns:a14="http://schemas.microsoft.com/office/drawing/2010/main" xmlns="" w="9525">
+                  <a14:hiddenLine xmlns="" xmlns:a14="http://schemas.microsoft.com/office/drawing/2010/main" w="9525">
                     <a:solidFill>
                       <a:srgbClr val="000000"/>
                     </a:solidFill>
@@ -10401,7 +10407,7 @@
               </a:ln>
               <a:extLst>
                 <a:ext uri="{91240B29-F687-4f45-9708-019B960494DF}">
-                  <a14:hiddenLine xmlns:a14="http://schemas.microsoft.com/office/drawing/2010/main" xmlns="" w="9525">
+                  <a14:hiddenLine xmlns="" xmlns:a14="http://schemas.microsoft.com/office/drawing/2010/main" w="9525">
                     <a:solidFill>
                       <a:srgbClr val="000000"/>
                     </a:solidFill>
@@ -10491,7 +10497,7 @@
               </a:ln>
               <a:extLst>
                 <a:ext uri="{91240B29-F687-4f45-9708-019B960494DF}">
-                  <a14:hiddenLine xmlns:a14="http://schemas.microsoft.com/office/drawing/2010/main" xmlns="" w="9525">
+                  <a14:hiddenLine xmlns="" xmlns:a14="http://schemas.microsoft.com/office/drawing/2010/main" w="9525">
                     <a:solidFill>
                       <a:srgbClr val="000000"/>
                     </a:solidFill>
@@ -10556,7 +10562,7 @@
               </a:ln>
               <a:extLst>
                 <a:ext uri="{91240B29-F687-4f45-9708-019B960494DF}">
-                  <a14:hiddenLine xmlns:a14="http://schemas.microsoft.com/office/drawing/2010/main" xmlns="" w="9525">
+                  <a14:hiddenLine xmlns="" xmlns:a14="http://schemas.microsoft.com/office/drawing/2010/main" w="9525">
                     <a:solidFill>
                       <a:srgbClr val="000000"/>
                     </a:solidFill>
@@ -10618,7 +10624,7 @@
               </a:ln>
               <a:extLst>
                 <a:ext uri="{91240B29-F687-4f45-9708-019B960494DF}">
-                  <a14:hiddenLine xmlns:a14="http://schemas.microsoft.com/office/drawing/2010/main" xmlns="" w="9525">
+                  <a14:hiddenLine xmlns="" xmlns:a14="http://schemas.microsoft.com/office/drawing/2010/main" w="9525">
                     <a:solidFill>
                       <a:srgbClr val="000000"/>
                     </a:solidFill>
@@ -10708,7 +10714,7 @@
               </a:ln>
               <a:extLst>
                 <a:ext uri="{91240B29-F687-4f45-9708-019B960494DF}">
-                  <a14:hiddenLine xmlns:a14="http://schemas.microsoft.com/office/drawing/2010/main" xmlns="" w="9525">
+                  <a14:hiddenLine xmlns="" xmlns:a14="http://schemas.microsoft.com/office/drawing/2010/main" w="9525">
                     <a:solidFill>
                       <a:srgbClr val="000000"/>
                     </a:solidFill>
@@ -10798,7 +10804,7 @@
               </a:ln>
               <a:extLst>
                 <a:ext uri="{91240B29-F687-4f45-9708-019B960494DF}">
-                  <a14:hiddenLine xmlns:a14="http://schemas.microsoft.com/office/drawing/2010/main" xmlns="" w="9525">
+                  <a14:hiddenLine xmlns="" xmlns:a14="http://schemas.microsoft.com/office/drawing/2010/main" w="9525">
                     <a:solidFill>
                       <a:srgbClr val="000000"/>
                     </a:solidFill>
@@ -10863,7 +10869,7 @@
               </a:ln>
               <a:extLst>
                 <a:ext uri="{91240B29-F687-4f45-9708-019B960494DF}">
-                  <a14:hiddenLine xmlns:a14="http://schemas.microsoft.com/office/drawing/2010/main" xmlns="" w="9525">
+                  <a14:hiddenLine xmlns="" xmlns:a14="http://schemas.microsoft.com/office/drawing/2010/main" w="9525">
                     <a:solidFill>
                       <a:srgbClr val="000000"/>
                     </a:solidFill>
@@ -10983,7 +10989,7 @@
               </a:ln>
               <a:extLst>
                 <a:ext uri="{91240B29-F687-4f45-9708-019B960494DF}">
-                  <a14:hiddenLine xmlns:a14="http://schemas.microsoft.com/office/drawing/2010/main" xmlns="" w="9525">
+                  <a14:hiddenLine xmlns="" xmlns:a14="http://schemas.microsoft.com/office/drawing/2010/main" w="9525">
                     <a:solidFill>
                       <a:srgbClr val="000000"/>
                     </a:solidFill>
@@ -11081,7 +11087,7 @@
               </a:ln>
               <a:extLst>
                 <a:ext uri="{91240B29-F687-4f45-9708-019B960494DF}">
-                  <a14:hiddenLine xmlns:a14="http://schemas.microsoft.com/office/drawing/2010/main" xmlns="" w="9525">
+                  <a14:hiddenLine xmlns="" xmlns:a14="http://schemas.microsoft.com/office/drawing/2010/main" w="9525">
                     <a:solidFill>
                       <a:srgbClr val="000000"/>
                     </a:solidFill>
@@ -11196,7 +11202,7 @@
               </a:ln>
               <a:extLst>
                 <a:ext uri="{91240B29-F687-4f45-9708-019B960494DF}">
-                  <a14:hiddenLine xmlns:a14="http://schemas.microsoft.com/office/drawing/2010/main" xmlns="" w="9525">
+                  <a14:hiddenLine xmlns="" xmlns:a14="http://schemas.microsoft.com/office/drawing/2010/main" w="9525">
                     <a:solidFill>
                       <a:srgbClr val="000000"/>
                     </a:solidFill>
@@ -11286,7 +11292,7 @@
               </a:ln>
               <a:extLst>
                 <a:ext uri="{91240B29-F687-4f45-9708-019B960494DF}">
-                  <a14:hiddenLine xmlns:a14="http://schemas.microsoft.com/office/drawing/2010/main" xmlns="" w="9525">
+                  <a14:hiddenLine xmlns="" xmlns:a14="http://schemas.microsoft.com/office/drawing/2010/main" w="9525">
                     <a:solidFill>
                       <a:srgbClr val="000000"/>
                     </a:solidFill>
@@ -11351,7 +11357,7 @@
               </a:ln>
               <a:extLst>
                 <a:ext uri="{91240B29-F687-4f45-9708-019B960494DF}">
-                  <a14:hiddenLine xmlns:a14="http://schemas.microsoft.com/office/drawing/2010/main" xmlns="" w="9525">
+                  <a14:hiddenLine xmlns="" xmlns:a14="http://schemas.microsoft.com/office/drawing/2010/main" w="9525">
                     <a:solidFill>
                       <a:srgbClr val="000000"/>
                     </a:solidFill>
@@ -11441,7 +11447,7 @@
               </a:ln>
               <a:extLst>
                 <a:ext uri="{91240B29-F687-4f45-9708-019B960494DF}">
-                  <a14:hiddenLine xmlns:a14="http://schemas.microsoft.com/office/drawing/2010/main" xmlns="" w="9525">
+                  <a14:hiddenLine xmlns="" xmlns:a14="http://schemas.microsoft.com/office/drawing/2010/main" w="9525">
                     <a:solidFill>
                       <a:srgbClr val="000000"/>
                     </a:solidFill>
@@ -11509,7 +11515,7 @@
               </a:ln>
               <a:extLst>
                 <a:ext uri="{91240B29-F687-4f45-9708-019B960494DF}">
-                  <a14:hiddenLine xmlns:a14="http://schemas.microsoft.com/office/drawing/2010/main" xmlns="" w="9525">
+                  <a14:hiddenLine xmlns="" xmlns:a14="http://schemas.microsoft.com/office/drawing/2010/main" w="9525">
                     <a:solidFill>
                       <a:srgbClr val="000000"/>
                     </a:solidFill>
@@ -11599,7 +11605,7 @@
               </a:ln>
               <a:extLst>
                 <a:ext uri="{91240B29-F687-4f45-9708-019B960494DF}">
-                  <a14:hiddenLine xmlns:a14="http://schemas.microsoft.com/office/drawing/2010/main" xmlns="" w="9525">
+                  <a14:hiddenLine xmlns="" xmlns:a14="http://schemas.microsoft.com/office/drawing/2010/main" w="9525">
                     <a:solidFill>
                       <a:srgbClr val="000000"/>
                     </a:solidFill>
@@ -11667,7 +11673,7 @@
               </a:ln>
               <a:extLst>
                 <a:ext uri="{91240B29-F687-4f45-9708-019B960494DF}">
-                  <a14:hiddenLine xmlns:a14="http://schemas.microsoft.com/office/drawing/2010/main" xmlns="" w="9525">
+                  <a14:hiddenLine xmlns="" xmlns:a14="http://schemas.microsoft.com/office/drawing/2010/main" w="9525">
                     <a:solidFill>
                       <a:srgbClr val="000000"/>
                     </a:solidFill>
@@ -11757,7 +11763,7 @@
               </a:ln>
               <a:extLst>
                 <a:ext uri="{91240B29-F687-4f45-9708-019B960494DF}">
-                  <a14:hiddenLine xmlns:a14="http://schemas.microsoft.com/office/drawing/2010/main" xmlns="" w="9525">
+                  <a14:hiddenLine xmlns="" xmlns:a14="http://schemas.microsoft.com/office/drawing/2010/main" w="9525">
                     <a:solidFill>
                       <a:srgbClr val="000000"/>
                     </a:solidFill>
@@ -11791,7 +11797,7 @@
               </a:ln>
               <a:extLst>
                 <a:ext uri="{91240B29-F687-4f45-9708-019B960494DF}">
-                  <a14:hiddenLine xmlns:a14="http://schemas.microsoft.com/office/drawing/2010/main" xmlns="" w="9525">
+                  <a14:hiddenLine xmlns="" xmlns:a14="http://schemas.microsoft.com/office/drawing/2010/main" w="9525">
                     <a:solidFill>
                       <a:srgbClr val="000000"/>
                     </a:solidFill>
@@ -11932,7 +11938,7 @@
             <a:fld id="{48A87A34-81AB-432B-8DAE-1953F412C126}" type="datetimeFigureOut">
               <a:rPr lang="en-US" dirty="0"/>
               <a:pPr/>
-              <a:t>11/26/2019</a:t>
+              <a:t>11/27/2019</a:t>
             </a:fld>
             <a:endParaRPr lang="en-US" dirty="0"/>
           </a:p>
@@ -12501,7 +12507,7 @@
         </p:spPr>
         <p:txBody>
           <a:bodyPr>
-            <a:normAutofit fontScale="92500" lnSpcReduction="10000"/>
+            <a:normAutofit fontScale="92500" lnSpcReduction="20000"/>
           </a:bodyPr>
           <a:lstStyle/>
           <a:p>
@@ -12888,6 +12894,96 @@
       </p:grpSpPr>
       <p:sp>
         <p:nvSpPr>
+          <p:cNvPr id="3" name="Espaço Reservado para Conteúdo 2"/>
+          <p:cNvSpPr>
+            <a:spLocks noGrp="1"/>
+          </p:cNvSpPr>
+          <p:nvPr>
+            <p:ph idx="1"/>
+          </p:nvPr>
+        </p:nvSpPr>
+        <p:spPr>
+          <a:xfrm>
+            <a:off x="1141412" y="391886"/>
+            <a:ext cx="9905999" cy="5399315"/>
+          </a:xfrm>
+        </p:spPr>
+        <p:txBody>
+          <a:bodyPr/>
+          <a:lstStyle/>
+          <a:p>
+            <a:r>
+              <a:rPr lang="pt-BR" dirty="0" smtClean="0"/>
+              <a:t>Para o desenvolvimento do sistema foi entrevistado um funcionário da empresa que tem acesso a todas as etapas de funcionamento da empresa.</a:t>
+            </a:r>
+          </a:p>
+          <a:p>
+            <a:r>
+              <a:rPr lang="pt-BR" dirty="0" smtClean="0"/>
+              <a:t>Com base nessa entrevista foram feitas as historias de usuário, casos de uso, requisitos funcionais e não funcionais.</a:t>
+            </a:r>
+          </a:p>
+          <a:p>
+            <a:r>
+              <a:rPr lang="pt-BR" dirty="0" smtClean="0"/>
+              <a:t>Foi definido que o sistema seria desenvolvido na linguagem C# utilizando o </a:t>
+            </a:r>
+            <a:r>
+              <a:rPr lang="pt-BR" dirty="0" err="1" smtClean="0"/>
+              <a:t>.net</a:t>
+            </a:r>
+            <a:r>
+              <a:rPr lang="pt-BR" dirty="0" smtClean="0"/>
+              <a:t> Framework 4.8 e o padrão MVC (ASP .NET MVC 5).</a:t>
+            </a:r>
+          </a:p>
+          <a:p>
+            <a:r>
+              <a:rPr lang="pt-BR" dirty="0" smtClean="0"/>
+              <a:t>Com esses dados foi desenvolvido um fluxograma com todos os módulos do produto e suas classes. </a:t>
+            </a:r>
+          </a:p>
+          <a:p>
+            <a:r>
+              <a:rPr lang="pt-BR" dirty="0" smtClean="0"/>
+              <a:t>O sistema final contempla todos os módulos e usabilidades citados porem ainda ele ainda pode ter outras funcionalidades que não serão incluídas nessa versão.</a:t>
+            </a:r>
+            <a:endParaRPr lang="pt-BR" dirty="0"/>
+          </a:p>
+        </p:txBody>
+      </p:sp>
+    </p:spTree>
+    <p:extLst>
+      <p:ext uri="{BB962C8B-B14F-4D97-AF65-F5344CB8AC3E}">
+        <p14:creationId xmlns:p14="http://schemas.microsoft.com/office/powerpoint/2010/main" val="3015381960"/>
+      </p:ext>
+    </p:extLst>
+  </p:cSld>
+  <p:clrMapOvr>
+    <a:masterClrMapping/>
+  </p:clrMapOvr>
+</p:sld>
+</file>
+
+<file path=ppt/slides/slide7.xml><?xml version="1.0" encoding="utf-8"?>
+<p:sld xmlns:a="http://schemas.openxmlformats.org/drawingml/2006/main" xmlns:r="http://schemas.openxmlformats.org/officeDocument/2006/relationships" xmlns:p="http://schemas.openxmlformats.org/presentationml/2006/main">
+  <p:cSld>
+    <p:spTree>
+      <p:nvGrpSpPr>
+        <p:cNvPr id="1" name=""/>
+        <p:cNvGrpSpPr/>
+        <p:nvPr/>
+      </p:nvGrpSpPr>
+      <p:grpSpPr>
+        <a:xfrm>
+          <a:off x="0" y="0"/>
+          <a:ext cx="0" cy="0"/>
+          <a:chOff x="0" y="0"/>
+          <a:chExt cx="0" cy="0"/>
+        </a:xfrm>
+      </p:grpSpPr>
+      <p:sp>
+        <p:nvSpPr>
           <p:cNvPr id="2" name="Título 1">
             <a:extLst>
               <a:ext uri="{FF2B5EF4-FFF2-40B4-BE49-F238E27FC236}">
@@ -12908,9 +13004,10 @@
           <a:lstStyle/>
           <a:p>
             <a:r>
-              <a:rPr lang="pt-BR" dirty="0"/>
-              <a:t>sistema</a:t>
+              <a:rPr lang="pt-BR" dirty="0" smtClean="0"/>
+              <a:t>O sistema</a:t>
             </a:r>
+            <a:endParaRPr lang="pt-BR" dirty="0"/>
           </a:p>
         </p:txBody>
       </p:sp>

</xml_diff>